<commit_message>
add files and modifications
</commit_message>
<xml_diff>
--- a/week-7/What-A-Book Project - Business Rules.pptx
+++ b/week-7/What-A-Book Project - Business Rules.pptx
@@ -7,6 +7,9 @@
   <p:sldIdLst>
     <p:sldId id="256" r:id="rId2"/>
     <p:sldId id="257" r:id="rId3"/>
+    <p:sldId id="258" r:id="rId4"/>
+    <p:sldId id="259" r:id="rId5"/>
+    <p:sldId id="260" r:id="rId6"/>
   </p:sldIdLst>
   <p:sldSz cx="12192000" cy="6858000"/>
   <p:notesSz cx="6858000" cy="9144000"/>
@@ -260,7 +263,7 @@
           <a:p>
             <a:fld id="{6241A387-C6C2-40C3-83D7-7464E1DD6970}" type="datetimeFigureOut">
               <a:rPr lang="en-US" smtClean="0"/>
-              <a:t>7/7/2023</a:t>
+              <a:t>7/8/2023</a:t>
             </a:fld>
             <a:endParaRPr lang="en-US"/>
           </a:p>
@@ -458,7 +461,7 @@
           <a:p>
             <a:fld id="{6241A387-C6C2-40C3-83D7-7464E1DD6970}" type="datetimeFigureOut">
               <a:rPr lang="en-US" smtClean="0"/>
-              <a:t>7/7/2023</a:t>
+              <a:t>7/8/2023</a:t>
             </a:fld>
             <a:endParaRPr lang="en-US"/>
           </a:p>
@@ -666,7 +669,7 @@
           <a:p>
             <a:fld id="{6241A387-C6C2-40C3-83D7-7464E1DD6970}" type="datetimeFigureOut">
               <a:rPr lang="en-US" smtClean="0"/>
-              <a:t>7/7/2023</a:t>
+              <a:t>7/8/2023</a:t>
             </a:fld>
             <a:endParaRPr lang="en-US"/>
           </a:p>
@@ -864,7 +867,7 @@
           <a:p>
             <a:fld id="{6241A387-C6C2-40C3-83D7-7464E1DD6970}" type="datetimeFigureOut">
               <a:rPr lang="en-US" smtClean="0"/>
-              <a:t>7/7/2023</a:t>
+              <a:t>7/8/2023</a:t>
             </a:fld>
             <a:endParaRPr lang="en-US"/>
           </a:p>
@@ -1139,7 +1142,7 @@
           <a:p>
             <a:fld id="{6241A387-C6C2-40C3-83D7-7464E1DD6970}" type="datetimeFigureOut">
               <a:rPr lang="en-US" smtClean="0"/>
-              <a:t>7/7/2023</a:t>
+              <a:t>7/8/2023</a:t>
             </a:fld>
             <a:endParaRPr lang="en-US"/>
           </a:p>
@@ -1404,7 +1407,7 @@
           <a:p>
             <a:fld id="{6241A387-C6C2-40C3-83D7-7464E1DD6970}" type="datetimeFigureOut">
               <a:rPr lang="en-US" smtClean="0"/>
-              <a:t>7/7/2023</a:t>
+              <a:t>7/8/2023</a:t>
             </a:fld>
             <a:endParaRPr lang="en-US"/>
           </a:p>
@@ -1816,7 +1819,7 @@
           <a:p>
             <a:fld id="{6241A387-C6C2-40C3-83D7-7464E1DD6970}" type="datetimeFigureOut">
               <a:rPr lang="en-US" smtClean="0"/>
-              <a:t>7/7/2023</a:t>
+              <a:t>7/8/2023</a:t>
             </a:fld>
             <a:endParaRPr lang="en-US"/>
           </a:p>
@@ -1957,7 +1960,7 @@
           <a:p>
             <a:fld id="{6241A387-C6C2-40C3-83D7-7464E1DD6970}" type="datetimeFigureOut">
               <a:rPr lang="en-US" smtClean="0"/>
-              <a:t>7/7/2023</a:t>
+              <a:t>7/8/2023</a:t>
             </a:fld>
             <a:endParaRPr lang="en-US"/>
           </a:p>
@@ -2070,7 +2073,7 @@
           <a:p>
             <a:fld id="{6241A387-C6C2-40C3-83D7-7464E1DD6970}" type="datetimeFigureOut">
               <a:rPr lang="en-US" smtClean="0"/>
-              <a:t>7/7/2023</a:t>
+              <a:t>7/8/2023</a:t>
             </a:fld>
             <a:endParaRPr lang="en-US"/>
           </a:p>
@@ -2381,7 +2384,7 @@
           <a:p>
             <a:fld id="{6241A387-C6C2-40C3-83D7-7464E1DD6970}" type="datetimeFigureOut">
               <a:rPr lang="en-US" smtClean="0"/>
-              <a:t>7/7/2023</a:t>
+              <a:t>7/8/2023</a:t>
             </a:fld>
             <a:endParaRPr lang="en-US"/>
           </a:p>
@@ -2669,7 +2672,7 @@
           <a:p>
             <a:fld id="{6241A387-C6C2-40C3-83D7-7464E1DD6970}" type="datetimeFigureOut">
               <a:rPr lang="en-US" smtClean="0"/>
-              <a:t>7/7/2023</a:t>
+              <a:t>7/8/2023</a:t>
             </a:fld>
             <a:endParaRPr lang="en-US"/>
           </a:p>
@@ -2910,7 +2913,7 @@
           <a:p>
             <a:fld id="{6241A387-C6C2-40C3-83D7-7464E1DD6970}" type="datetimeFigureOut">
               <a:rPr lang="en-US" smtClean="0"/>
-              <a:t>7/7/2023</a:t>
+              <a:t>7/8/2023</a:t>
             </a:fld>
             <a:endParaRPr lang="en-US"/>
           </a:p>
@@ -5760,6 +5763,2013 @@
 </p:sld>
 </file>
 
+<file path=ppt/slides/slide3.xml><?xml version="1.0" encoding="utf-8"?>
+<p:sld xmlns:a="http://schemas.openxmlformats.org/drawingml/2006/main" xmlns:r="http://schemas.openxmlformats.org/officeDocument/2006/relationships" xmlns:p="http://schemas.openxmlformats.org/presentationml/2006/main">
+  <p:cSld>
+    <p:spTree>
+      <p:nvGrpSpPr>
+        <p:cNvPr id="1" name=""/>
+        <p:cNvGrpSpPr/>
+        <p:nvPr/>
+      </p:nvGrpSpPr>
+      <p:grpSpPr>
+        <a:xfrm>
+          <a:off x="0" y="0"/>
+          <a:ext cx="0" cy="0"/>
+          <a:chOff x="0" y="0"/>
+          <a:chExt cx="0" cy="0"/>
+        </a:xfrm>
+      </p:grpSpPr>
+      <p:grpSp>
+        <p:nvGrpSpPr>
+          <p:cNvPr id="4" name="Group 3">
+            <a:extLst>
+              <a:ext uri="{FF2B5EF4-FFF2-40B4-BE49-F238E27FC236}">
+                <a16:creationId xmlns:a16="http://schemas.microsoft.com/office/drawing/2014/main" id="{45B5D036-0BD3-116C-431D-F4592753F33A}"/>
+              </a:ext>
+            </a:extLst>
+          </p:cNvPr>
+          <p:cNvGrpSpPr/>
+          <p:nvPr/>
+        </p:nvGrpSpPr>
+        <p:grpSpPr>
+          <a:xfrm>
+            <a:off x="827818" y="2732824"/>
+            <a:ext cx="1620107" cy="2038350"/>
+            <a:chOff x="971551" y="923916"/>
+            <a:chExt cx="1428750" cy="942984"/>
+          </a:xfrm>
+        </p:grpSpPr>
+        <p:sp>
+          <p:nvSpPr>
+            <p:cNvPr id="5" name="Rectangle 4">
+              <a:extLst>
+                <a:ext uri="{FF2B5EF4-FFF2-40B4-BE49-F238E27FC236}">
+                  <a16:creationId xmlns:a16="http://schemas.microsoft.com/office/drawing/2014/main" id="{968158BC-7E17-E34B-1686-30650F5EFA33}"/>
+                </a:ext>
+              </a:extLst>
+            </p:cNvPr>
+            <p:cNvSpPr/>
+            <p:nvPr/>
+          </p:nvSpPr>
+          <p:spPr>
+            <a:xfrm>
+              <a:off x="971551" y="923916"/>
+              <a:ext cx="1428750" cy="171459"/>
+            </a:xfrm>
+            <a:prstGeom prst="rect">
+              <a:avLst/>
+            </a:prstGeom>
+            <a:noFill/>
+            <a:ln w="25400">
+              <a:solidFill>
+                <a:schemeClr val="tx1"/>
+              </a:solidFill>
+            </a:ln>
+          </p:spPr>
+          <p:style>
+            <a:lnRef idx="2">
+              <a:schemeClr val="accent1">
+                <a:shade val="50000"/>
+              </a:schemeClr>
+            </a:lnRef>
+            <a:fillRef idx="1">
+              <a:schemeClr val="accent1"/>
+            </a:fillRef>
+            <a:effectRef idx="0">
+              <a:schemeClr val="accent1"/>
+            </a:effectRef>
+            <a:fontRef idx="minor">
+              <a:schemeClr val="lt1"/>
+            </a:fontRef>
+          </p:style>
+          <p:txBody>
+            <a:bodyPr rtlCol="0" anchor="ctr"/>
+            <a:lstStyle/>
+            <a:p>
+              <a:pPr algn="ctr"/>
+              <a:r>
+                <a:rPr lang="en-US" dirty="0">
+                  <a:solidFill>
+                    <a:schemeClr val="tx1"/>
+                  </a:solidFill>
+                </a:rPr>
+                <a:t>Customer</a:t>
+              </a:r>
+            </a:p>
+          </p:txBody>
+        </p:sp>
+        <p:sp>
+          <p:nvSpPr>
+            <p:cNvPr id="6" name="Rectangle 5">
+              <a:extLst>
+                <a:ext uri="{FF2B5EF4-FFF2-40B4-BE49-F238E27FC236}">
+                  <a16:creationId xmlns:a16="http://schemas.microsoft.com/office/drawing/2014/main" id="{D60823B7-CCE7-C466-84AF-1715FFD5D4C9}"/>
+                </a:ext>
+              </a:extLst>
+            </p:cNvPr>
+            <p:cNvSpPr/>
+            <p:nvPr/>
+          </p:nvSpPr>
+          <p:spPr>
+            <a:xfrm>
+              <a:off x="971551" y="1095375"/>
+              <a:ext cx="1428750" cy="771525"/>
+            </a:xfrm>
+            <a:prstGeom prst="rect">
+              <a:avLst/>
+            </a:prstGeom>
+            <a:noFill/>
+            <a:ln w="25400">
+              <a:solidFill>
+                <a:schemeClr val="tx1"/>
+              </a:solidFill>
+            </a:ln>
+          </p:spPr>
+          <p:style>
+            <a:lnRef idx="2">
+              <a:schemeClr val="accent1">
+                <a:shade val="50000"/>
+              </a:schemeClr>
+            </a:lnRef>
+            <a:fillRef idx="1">
+              <a:schemeClr val="accent1"/>
+            </a:fillRef>
+            <a:effectRef idx="0">
+              <a:schemeClr val="accent1"/>
+            </a:effectRef>
+            <a:fontRef idx="minor">
+              <a:schemeClr val="lt1"/>
+            </a:fontRef>
+          </p:style>
+          <p:txBody>
+            <a:bodyPr rtlCol="0" anchor="ctr"/>
+            <a:lstStyle/>
+            <a:p>
+              <a:r>
+                <a:rPr lang="en-US" dirty="0">
+                  <a:solidFill>
+                    <a:schemeClr val="tx1"/>
+                  </a:solidFill>
+                </a:rPr>
+                <a:t>-</a:t>
+              </a:r>
+              <a:r>
+                <a:rPr lang="en-US" dirty="0" err="1">
+                  <a:solidFill>
+                    <a:schemeClr val="tx1"/>
+                  </a:solidFill>
+                </a:rPr>
+                <a:t>customerID</a:t>
+              </a:r>
+              <a:endParaRPr lang="en-US" dirty="0">
+                <a:solidFill>
+                  <a:schemeClr val="tx1"/>
+                </a:solidFill>
+              </a:endParaRPr>
+            </a:p>
+            <a:p>
+              <a:r>
+                <a:rPr lang="en-US" dirty="0">
+                  <a:solidFill>
+                    <a:schemeClr val="tx1"/>
+                  </a:solidFill>
+                </a:rPr>
+                <a:t>-</a:t>
+              </a:r>
+              <a:r>
+                <a:rPr lang="en-US" dirty="0" err="1">
+                  <a:solidFill>
+                    <a:schemeClr val="tx1"/>
+                  </a:solidFill>
+                </a:rPr>
+                <a:t>firstName</a:t>
+              </a:r>
+              <a:endParaRPr lang="en-US" dirty="0">
+                <a:solidFill>
+                  <a:schemeClr val="tx1"/>
+                </a:solidFill>
+              </a:endParaRPr>
+            </a:p>
+            <a:p>
+              <a:r>
+                <a:rPr lang="en-US" dirty="0">
+                  <a:solidFill>
+                    <a:schemeClr val="tx1"/>
+                  </a:solidFill>
+                </a:rPr>
+                <a:t>-</a:t>
+              </a:r>
+              <a:r>
+                <a:rPr lang="en-US" dirty="0" err="1">
+                  <a:solidFill>
+                    <a:schemeClr val="tx1"/>
+                  </a:solidFill>
+                </a:rPr>
+                <a:t>lastName</a:t>
+              </a:r>
+              <a:endParaRPr lang="en-US" dirty="0">
+                <a:solidFill>
+                  <a:schemeClr val="tx1"/>
+                </a:solidFill>
+              </a:endParaRPr>
+            </a:p>
+          </p:txBody>
+        </p:sp>
+      </p:grpSp>
+      <p:grpSp>
+        <p:nvGrpSpPr>
+          <p:cNvPr id="7" name="Group 6">
+            <a:extLst>
+              <a:ext uri="{FF2B5EF4-FFF2-40B4-BE49-F238E27FC236}">
+                <a16:creationId xmlns:a16="http://schemas.microsoft.com/office/drawing/2014/main" id="{6BF3DFBE-4634-0151-E207-223F45F9F47E}"/>
+              </a:ext>
+            </a:extLst>
+          </p:cNvPr>
+          <p:cNvGrpSpPr/>
+          <p:nvPr/>
+        </p:nvGrpSpPr>
+        <p:grpSpPr>
+          <a:xfrm>
+            <a:off x="827818" y="323850"/>
+            <a:ext cx="1620107" cy="2038350"/>
+            <a:chOff x="971551" y="923916"/>
+            <a:chExt cx="1428750" cy="942984"/>
+          </a:xfrm>
+        </p:grpSpPr>
+        <p:sp>
+          <p:nvSpPr>
+            <p:cNvPr id="8" name="Rectangle 7">
+              <a:extLst>
+                <a:ext uri="{FF2B5EF4-FFF2-40B4-BE49-F238E27FC236}">
+                  <a16:creationId xmlns:a16="http://schemas.microsoft.com/office/drawing/2014/main" id="{9B5D07AB-6BCD-E0D8-192C-447073B809B5}"/>
+                </a:ext>
+              </a:extLst>
+            </p:cNvPr>
+            <p:cNvSpPr/>
+            <p:nvPr/>
+          </p:nvSpPr>
+          <p:spPr>
+            <a:xfrm>
+              <a:off x="971551" y="923916"/>
+              <a:ext cx="1428750" cy="171459"/>
+            </a:xfrm>
+            <a:prstGeom prst="rect">
+              <a:avLst/>
+            </a:prstGeom>
+            <a:noFill/>
+            <a:ln w="25400">
+              <a:solidFill>
+                <a:schemeClr val="tx1"/>
+              </a:solidFill>
+            </a:ln>
+          </p:spPr>
+          <p:style>
+            <a:lnRef idx="2">
+              <a:schemeClr val="accent1">
+                <a:shade val="50000"/>
+              </a:schemeClr>
+            </a:lnRef>
+            <a:fillRef idx="1">
+              <a:schemeClr val="accent1"/>
+            </a:fillRef>
+            <a:effectRef idx="0">
+              <a:schemeClr val="accent1"/>
+            </a:effectRef>
+            <a:fontRef idx="minor">
+              <a:schemeClr val="lt1"/>
+            </a:fontRef>
+          </p:style>
+          <p:txBody>
+            <a:bodyPr rtlCol="0" anchor="ctr"/>
+            <a:lstStyle/>
+            <a:p>
+              <a:pPr algn="ctr"/>
+              <a:r>
+                <a:rPr lang="en-US" dirty="0">
+                  <a:solidFill>
+                    <a:schemeClr val="tx1"/>
+                  </a:solidFill>
+                </a:rPr>
+                <a:t>Books</a:t>
+              </a:r>
+            </a:p>
+          </p:txBody>
+        </p:sp>
+        <p:sp>
+          <p:nvSpPr>
+            <p:cNvPr id="9" name="Rectangle 8">
+              <a:extLst>
+                <a:ext uri="{FF2B5EF4-FFF2-40B4-BE49-F238E27FC236}">
+                  <a16:creationId xmlns:a16="http://schemas.microsoft.com/office/drawing/2014/main" id="{FFFD0F0C-EEA3-3CA4-FB17-2E49339D177C}"/>
+                </a:ext>
+              </a:extLst>
+            </p:cNvPr>
+            <p:cNvSpPr/>
+            <p:nvPr/>
+          </p:nvSpPr>
+          <p:spPr>
+            <a:xfrm>
+              <a:off x="971551" y="1095375"/>
+              <a:ext cx="1428750" cy="771525"/>
+            </a:xfrm>
+            <a:prstGeom prst="rect">
+              <a:avLst/>
+            </a:prstGeom>
+            <a:noFill/>
+            <a:ln w="25400">
+              <a:solidFill>
+                <a:schemeClr val="tx1"/>
+              </a:solidFill>
+            </a:ln>
+          </p:spPr>
+          <p:style>
+            <a:lnRef idx="2">
+              <a:schemeClr val="accent1">
+                <a:shade val="50000"/>
+              </a:schemeClr>
+            </a:lnRef>
+            <a:fillRef idx="1">
+              <a:schemeClr val="accent1"/>
+            </a:fillRef>
+            <a:effectRef idx="0">
+              <a:schemeClr val="accent1"/>
+            </a:effectRef>
+            <a:fontRef idx="minor">
+              <a:schemeClr val="lt1"/>
+            </a:fontRef>
+          </p:style>
+          <p:txBody>
+            <a:bodyPr rtlCol="0" anchor="ctr"/>
+            <a:lstStyle/>
+            <a:p>
+              <a:r>
+                <a:rPr lang="en-US" dirty="0">
+                  <a:solidFill>
+                    <a:schemeClr val="tx1"/>
+                  </a:solidFill>
+                </a:rPr>
+                <a:t>-</a:t>
+              </a:r>
+              <a:r>
+                <a:rPr lang="en-US" dirty="0" err="1">
+                  <a:solidFill>
+                    <a:schemeClr val="tx1"/>
+                  </a:solidFill>
+                </a:rPr>
+                <a:t>bookID</a:t>
+              </a:r>
+              <a:endParaRPr lang="en-US" dirty="0">
+                <a:solidFill>
+                  <a:schemeClr val="tx1"/>
+                </a:solidFill>
+              </a:endParaRPr>
+            </a:p>
+            <a:p>
+              <a:r>
+                <a:rPr lang="en-US" dirty="0">
+                  <a:solidFill>
+                    <a:schemeClr val="tx1"/>
+                  </a:solidFill>
+                </a:rPr>
+                <a:t>-title</a:t>
+              </a:r>
+            </a:p>
+            <a:p>
+              <a:r>
+                <a:rPr lang="en-US" dirty="0">
+                  <a:solidFill>
+                    <a:schemeClr val="tx1"/>
+                  </a:solidFill>
+                </a:rPr>
+                <a:t>-genre</a:t>
+              </a:r>
+            </a:p>
+            <a:p>
+              <a:r>
+                <a:rPr lang="en-US" dirty="0">
+                  <a:solidFill>
+                    <a:schemeClr val="tx1"/>
+                  </a:solidFill>
+                </a:rPr>
+                <a:t>-author</a:t>
+              </a:r>
+            </a:p>
+          </p:txBody>
+        </p:sp>
+      </p:grpSp>
+      <p:grpSp>
+        <p:nvGrpSpPr>
+          <p:cNvPr id="10" name="Group 9">
+            <a:extLst>
+              <a:ext uri="{FF2B5EF4-FFF2-40B4-BE49-F238E27FC236}">
+                <a16:creationId xmlns:a16="http://schemas.microsoft.com/office/drawing/2014/main" id="{3675B89E-B212-67F5-526E-54CF86A39174}"/>
+              </a:ext>
+            </a:extLst>
+          </p:cNvPr>
+          <p:cNvGrpSpPr/>
+          <p:nvPr/>
+        </p:nvGrpSpPr>
+        <p:grpSpPr>
+          <a:xfrm>
+            <a:off x="7038118" y="1528337"/>
+            <a:ext cx="1620107" cy="2038350"/>
+            <a:chOff x="971551" y="923916"/>
+            <a:chExt cx="1428750" cy="942984"/>
+          </a:xfrm>
+        </p:grpSpPr>
+        <p:sp>
+          <p:nvSpPr>
+            <p:cNvPr id="11" name="Rectangle 10">
+              <a:extLst>
+                <a:ext uri="{FF2B5EF4-FFF2-40B4-BE49-F238E27FC236}">
+                  <a16:creationId xmlns:a16="http://schemas.microsoft.com/office/drawing/2014/main" id="{F62F6484-629C-54DA-EEBB-8374FA2E696A}"/>
+                </a:ext>
+              </a:extLst>
+            </p:cNvPr>
+            <p:cNvSpPr/>
+            <p:nvPr/>
+          </p:nvSpPr>
+          <p:spPr>
+            <a:xfrm>
+              <a:off x="971551" y="923916"/>
+              <a:ext cx="1428750" cy="171459"/>
+            </a:xfrm>
+            <a:prstGeom prst="rect">
+              <a:avLst/>
+            </a:prstGeom>
+            <a:noFill/>
+            <a:ln w="25400">
+              <a:solidFill>
+                <a:schemeClr val="tx1"/>
+              </a:solidFill>
+            </a:ln>
+          </p:spPr>
+          <p:style>
+            <a:lnRef idx="2">
+              <a:schemeClr val="accent1">
+                <a:shade val="50000"/>
+              </a:schemeClr>
+            </a:lnRef>
+            <a:fillRef idx="1">
+              <a:schemeClr val="accent1"/>
+            </a:fillRef>
+            <a:effectRef idx="0">
+              <a:schemeClr val="accent1"/>
+            </a:effectRef>
+            <a:fontRef idx="minor">
+              <a:schemeClr val="lt1"/>
+            </a:fontRef>
+          </p:style>
+          <p:txBody>
+            <a:bodyPr rtlCol="0" anchor="ctr"/>
+            <a:lstStyle/>
+            <a:p>
+              <a:pPr algn="ctr"/>
+              <a:r>
+                <a:rPr lang="en-US" dirty="0">
+                  <a:solidFill>
+                    <a:schemeClr val="tx1"/>
+                  </a:solidFill>
+                </a:rPr>
+                <a:t>Wish list</a:t>
+              </a:r>
+            </a:p>
+          </p:txBody>
+        </p:sp>
+        <p:sp>
+          <p:nvSpPr>
+            <p:cNvPr id="12" name="Rectangle 11">
+              <a:extLst>
+                <a:ext uri="{FF2B5EF4-FFF2-40B4-BE49-F238E27FC236}">
+                  <a16:creationId xmlns:a16="http://schemas.microsoft.com/office/drawing/2014/main" id="{6B87E56F-A9FD-CD0B-F4D7-1230F35F8E3E}"/>
+                </a:ext>
+              </a:extLst>
+            </p:cNvPr>
+            <p:cNvSpPr/>
+            <p:nvPr/>
+          </p:nvSpPr>
+          <p:spPr>
+            <a:xfrm>
+              <a:off x="971551" y="1095375"/>
+              <a:ext cx="1428750" cy="771525"/>
+            </a:xfrm>
+            <a:prstGeom prst="rect">
+              <a:avLst/>
+            </a:prstGeom>
+            <a:noFill/>
+            <a:ln w="25400">
+              <a:solidFill>
+                <a:schemeClr val="tx1"/>
+              </a:solidFill>
+            </a:ln>
+          </p:spPr>
+          <p:style>
+            <a:lnRef idx="2">
+              <a:schemeClr val="accent1">
+                <a:shade val="50000"/>
+              </a:schemeClr>
+            </a:lnRef>
+            <a:fillRef idx="1">
+              <a:schemeClr val="accent1"/>
+            </a:fillRef>
+            <a:effectRef idx="0">
+              <a:schemeClr val="accent1"/>
+            </a:effectRef>
+            <a:fontRef idx="minor">
+              <a:schemeClr val="lt1"/>
+            </a:fontRef>
+          </p:style>
+          <p:txBody>
+            <a:bodyPr rtlCol="0" anchor="ctr"/>
+            <a:lstStyle/>
+            <a:p>
+              <a:r>
+                <a:rPr lang="en-US" dirty="0">
+                  <a:solidFill>
+                    <a:schemeClr val="tx1"/>
+                  </a:solidFill>
+                </a:rPr>
+                <a:t>-</a:t>
+              </a:r>
+              <a:r>
+                <a:rPr lang="en-US" dirty="0" err="1">
+                  <a:solidFill>
+                    <a:schemeClr val="tx1"/>
+                  </a:solidFill>
+                </a:rPr>
+                <a:t>bookID</a:t>
+              </a:r>
+              <a:endParaRPr lang="en-US" dirty="0">
+                <a:solidFill>
+                  <a:schemeClr val="tx1"/>
+                </a:solidFill>
+              </a:endParaRPr>
+            </a:p>
+            <a:p>
+              <a:r>
+                <a:rPr lang="en-US" dirty="0">
+                  <a:solidFill>
+                    <a:schemeClr val="tx1"/>
+                  </a:solidFill>
+                </a:rPr>
+                <a:t>-title</a:t>
+              </a:r>
+            </a:p>
+          </p:txBody>
+        </p:sp>
+      </p:grpSp>
+    </p:spTree>
+    <p:extLst>
+      <p:ext uri="{BB962C8B-B14F-4D97-AF65-F5344CB8AC3E}">
+        <p14:creationId xmlns:p14="http://schemas.microsoft.com/office/powerpoint/2010/main" val="1788755820"/>
+      </p:ext>
+    </p:extLst>
+  </p:cSld>
+  <p:clrMapOvr>
+    <a:masterClrMapping/>
+  </p:clrMapOvr>
+</p:sld>
+</file>
+
+<file path=ppt/slides/slide4.xml><?xml version="1.0" encoding="utf-8"?>
+<p:sld xmlns:a="http://schemas.openxmlformats.org/drawingml/2006/main" xmlns:r="http://schemas.openxmlformats.org/officeDocument/2006/relationships" xmlns:p="http://schemas.openxmlformats.org/presentationml/2006/main">
+  <p:cSld>
+    <p:spTree>
+      <p:nvGrpSpPr>
+        <p:cNvPr id="1" name=""/>
+        <p:cNvGrpSpPr/>
+        <p:nvPr/>
+      </p:nvGrpSpPr>
+      <p:grpSpPr>
+        <a:xfrm>
+          <a:off x="0" y="0"/>
+          <a:ext cx="0" cy="0"/>
+          <a:chOff x="0" y="0"/>
+          <a:chExt cx="0" cy="0"/>
+        </a:xfrm>
+      </p:grpSpPr>
+      <p:grpSp>
+        <p:nvGrpSpPr>
+          <p:cNvPr id="2" name="Group 1">
+            <a:extLst>
+              <a:ext uri="{FF2B5EF4-FFF2-40B4-BE49-F238E27FC236}">
+                <a16:creationId xmlns:a16="http://schemas.microsoft.com/office/drawing/2014/main" id="{225EA3C2-0460-42E5-C996-868F232C9D86}"/>
+              </a:ext>
+            </a:extLst>
+          </p:cNvPr>
+          <p:cNvGrpSpPr/>
+          <p:nvPr/>
+        </p:nvGrpSpPr>
+        <p:grpSpPr>
+          <a:xfrm>
+            <a:off x="1332643" y="589699"/>
+            <a:ext cx="1620107" cy="2038350"/>
+            <a:chOff x="971551" y="923916"/>
+            <a:chExt cx="1428750" cy="942984"/>
+          </a:xfrm>
+        </p:grpSpPr>
+        <p:sp>
+          <p:nvSpPr>
+            <p:cNvPr id="3" name="Rectangle 2">
+              <a:extLst>
+                <a:ext uri="{FF2B5EF4-FFF2-40B4-BE49-F238E27FC236}">
+                  <a16:creationId xmlns:a16="http://schemas.microsoft.com/office/drawing/2014/main" id="{1C997B07-3E6A-7367-CBB4-533FDAB53810}"/>
+                </a:ext>
+              </a:extLst>
+            </p:cNvPr>
+            <p:cNvSpPr/>
+            <p:nvPr/>
+          </p:nvSpPr>
+          <p:spPr>
+            <a:xfrm>
+              <a:off x="971551" y="923916"/>
+              <a:ext cx="1428750" cy="171459"/>
+            </a:xfrm>
+            <a:prstGeom prst="rect">
+              <a:avLst/>
+            </a:prstGeom>
+            <a:noFill/>
+            <a:ln w="25400">
+              <a:solidFill>
+                <a:schemeClr val="tx1"/>
+              </a:solidFill>
+            </a:ln>
+          </p:spPr>
+          <p:style>
+            <a:lnRef idx="2">
+              <a:schemeClr val="accent1">
+                <a:shade val="50000"/>
+              </a:schemeClr>
+            </a:lnRef>
+            <a:fillRef idx="1">
+              <a:schemeClr val="accent1"/>
+            </a:fillRef>
+            <a:effectRef idx="0">
+              <a:schemeClr val="accent1"/>
+            </a:effectRef>
+            <a:fontRef idx="minor">
+              <a:schemeClr val="lt1"/>
+            </a:fontRef>
+          </p:style>
+          <p:txBody>
+            <a:bodyPr rtlCol="0" anchor="ctr"/>
+            <a:lstStyle/>
+            <a:p>
+              <a:pPr algn="ctr"/>
+              <a:r>
+                <a:rPr lang="en-US" dirty="0">
+                  <a:solidFill>
+                    <a:schemeClr val="tx1"/>
+                  </a:solidFill>
+                </a:rPr>
+                <a:t>Customer</a:t>
+              </a:r>
+            </a:p>
+          </p:txBody>
+        </p:sp>
+        <p:sp>
+          <p:nvSpPr>
+            <p:cNvPr id="4" name="Rectangle 3">
+              <a:extLst>
+                <a:ext uri="{FF2B5EF4-FFF2-40B4-BE49-F238E27FC236}">
+                  <a16:creationId xmlns:a16="http://schemas.microsoft.com/office/drawing/2014/main" id="{EC22A9D0-204C-43B7-BC48-1B2C6CE41E2C}"/>
+                </a:ext>
+              </a:extLst>
+            </p:cNvPr>
+            <p:cNvSpPr/>
+            <p:nvPr/>
+          </p:nvSpPr>
+          <p:spPr>
+            <a:xfrm>
+              <a:off x="971551" y="1095375"/>
+              <a:ext cx="1428750" cy="771525"/>
+            </a:xfrm>
+            <a:prstGeom prst="rect">
+              <a:avLst/>
+            </a:prstGeom>
+            <a:noFill/>
+            <a:ln w="25400">
+              <a:solidFill>
+                <a:schemeClr val="tx1"/>
+              </a:solidFill>
+            </a:ln>
+          </p:spPr>
+          <p:style>
+            <a:lnRef idx="2">
+              <a:schemeClr val="accent1">
+                <a:shade val="50000"/>
+              </a:schemeClr>
+            </a:lnRef>
+            <a:fillRef idx="1">
+              <a:schemeClr val="accent1"/>
+            </a:fillRef>
+            <a:effectRef idx="0">
+              <a:schemeClr val="accent1"/>
+            </a:effectRef>
+            <a:fontRef idx="minor">
+              <a:schemeClr val="lt1"/>
+            </a:fontRef>
+          </p:style>
+          <p:txBody>
+            <a:bodyPr rtlCol="0" anchor="ctr"/>
+            <a:lstStyle/>
+            <a:p>
+              <a:r>
+                <a:rPr lang="en-US" dirty="0">
+                  <a:solidFill>
+                    <a:schemeClr val="tx1"/>
+                  </a:solidFill>
+                </a:rPr>
+                <a:t>-</a:t>
+              </a:r>
+              <a:r>
+                <a:rPr lang="en-US" dirty="0" err="1">
+                  <a:solidFill>
+                    <a:schemeClr val="tx1"/>
+                  </a:solidFill>
+                </a:rPr>
+                <a:t>customerID</a:t>
+              </a:r>
+              <a:endParaRPr lang="en-US" dirty="0">
+                <a:solidFill>
+                  <a:schemeClr val="tx1"/>
+                </a:solidFill>
+              </a:endParaRPr>
+            </a:p>
+            <a:p>
+              <a:r>
+                <a:rPr lang="en-US" dirty="0">
+                  <a:solidFill>
+                    <a:schemeClr val="tx1"/>
+                  </a:solidFill>
+                </a:rPr>
+                <a:t>-</a:t>
+              </a:r>
+              <a:r>
+                <a:rPr lang="en-US" dirty="0" err="1">
+                  <a:solidFill>
+                    <a:schemeClr val="tx1"/>
+                  </a:solidFill>
+                </a:rPr>
+                <a:t>firstName</a:t>
+              </a:r>
+              <a:endParaRPr lang="en-US" dirty="0">
+                <a:solidFill>
+                  <a:schemeClr val="tx1"/>
+                </a:solidFill>
+              </a:endParaRPr>
+            </a:p>
+            <a:p>
+              <a:r>
+                <a:rPr lang="en-US" dirty="0">
+                  <a:solidFill>
+                    <a:schemeClr val="tx1"/>
+                  </a:solidFill>
+                </a:rPr>
+                <a:t>-</a:t>
+              </a:r>
+              <a:r>
+                <a:rPr lang="en-US" dirty="0" err="1">
+                  <a:solidFill>
+                    <a:schemeClr val="tx1"/>
+                  </a:solidFill>
+                </a:rPr>
+                <a:t>lastName</a:t>
+              </a:r>
+              <a:endParaRPr lang="en-US" dirty="0">
+                <a:solidFill>
+                  <a:schemeClr val="tx1"/>
+                </a:solidFill>
+              </a:endParaRPr>
+            </a:p>
+          </p:txBody>
+        </p:sp>
+      </p:grpSp>
+      <p:grpSp>
+        <p:nvGrpSpPr>
+          <p:cNvPr id="5" name="Group 4">
+            <a:extLst>
+              <a:ext uri="{FF2B5EF4-FFF2-40B4-BE49-F238E27FC236}">
+                <a16:creationId xmlns:a16="http://schemas.microsoft.com/office/drawing/2014/main" id="{9D43ED35-A55D-3A1A-7BF0-86EB21F3A6E0}"/>
+              </a:ext>
+            </a:extLst>
+          </p:cNvPr>
+          <p:cNvGrpSpPr/>
+          <p:nvPr/>
+        </p:nvGrpSpPr>
+        <p:grpSpPr>
+          <a:xfrm>
+            <a:off x="4733068" y="589699"/>
+            <a:ext cx="1620107" cy="2038350"/>
+            <a:chOff x="971551" y="923916"/>
+            <a:chExt cx="1428750" cy="942984"/>
+          </a:xfrm>
+        </p:grpSpPr>
+        <p:sp>
+          <p:nvSpPr>
+            <p:cNvPr id="6" name="Rectangle 5">
+              <a:extLst>
+                <a:ext uri="{FF2B5EF4-FFF2-40B4-BE49-F238E27FC236}">
+                  <a16:creationId xmlns:a16="http://schemas.microsoft.com/office/drawing/2014/main" id="{76955B47-B3A6-C6AC-67B3-6F9C9296F559}"/>
+                </a:ext>
+              </a:extLst>
+            </p:cNvPr>
+            <p:cNvSpPr/>
+            <p:nvPr/>
+          </p:nvSpPr>
+          <p:spPr>
+            <a:xfrm>
+              <a:off x="971551" y="923916"/>
+              <a:ext cx="1428750" cy="171459"/>
+            </a:xfrm>
+            <a:prstGeom prst="rect">
+              <a:avLst/>
+            </a:prstGeom>
+            <a:noFill/>
+            <a:ln w="25400">
+              <a:solidFill>
+                <a:schemeClr val="tx1"/>
+              </a:solidFill>
+            </a:ln>
+          </p:spPr>
+          <p:style>
+            <a:lnRef idx="2">
+              <a:schemeClr val="accent1">
+                <a:shade val="50000"/>
+              </a:schemeClr>
+            </a:lnRef>
+            <a:fillRef idx="1">
+              <a:schemeClr val="accent1"/>
+            </a:fillRef>
+            <a:effectRef idx="0">
+              <a:schemeClr val="accent1"/>
+            </a:effectRef>
+            <a:fontRef idx="minor">
+              <a:schemeClr val="lt1"/>
+            </a:fontRef>
+          </p:style>
+          <p:txBody>
+            <a:bodyPr rtlCol="0" anchor="ctr"/>
+            <a:lstStyle/>
+            <a:p>
+              <a:pPr algn="ctr"/>
+              <a:r>
+                <a:rPr lang="en-US" dirty="0">
+                  <a:solidFill>
+                    <a:schemeClr val="tx1"/>
+                  </a:solidFill>
+                </a:rPr>
+                <a:t>Books</a:t>
+              </a:r>
+            </a:p>
+          </p:txBody>
+        </p:sp>
+        <p:sp>
+          <p:nvSpPr>
+            <p:cNvPr id="7" name="Rectangle 6">
+              <a:extLst>
+                <a:ext uri="{FF2B5EF4-FFF2-40B4-BE49-F238E27FC236}">
+                  <a16:creationId xmlns:a16="http://schemas.microsoft.com/office/drawing/2014/main" id="{AAD28666-E63C-E07B-3A00-5D78CF833EC8}"/>
+                </a:ext>
+              </a:extLst>
+            </p:cNvPr>
+            <p:cNvSpPr/>
+            <p:nvPr/>
+          </p:nvSpPr>
+          <p:spPr>
+            <a:xfrm>
+              <a:off x="971551" y="1095375"/>
+              <a:ext cx="1428750" cy="771525"/>
+            </a:xfrm>
+            <a:prstGeom prst="rect">
+              <a:avLst/>
+            </a:prstGeom>
+            <a:noFill/>
+            <a:ln w="25400">
+              <a:solidFill>
+                <a:schemeClr val="tx1"/>
+              </a:solidFill>
+            </a:ln>
+          </p:spPr>
+          <p:style>
+            <a:lnRef idx="2">
+              <a:schemeClr val="accent1">
+                <a:shade val="50000"/>
+              </a:schemeClr>
+            </a:lnRef>
+            <a:fillRef idx="1">
+              <a:schemeClr val="accent1"/>
+            </a:fillRef>
+            <a:effectRef idx="0">
+              <a:schemeClr val="accent1"/>
+            </a:effectRef>
+            <a:fontRef idx="minor">
+              <a:schemeClr val="lt1"/>
+            </a:fontRef>
+          </p:style>
+          <p:txBody>
+            <a:bodyPr rtlCol="0" anchor="ctr"/>
+            <a:lstStyle/>
+            <a:p>
+              <a:r>
+                <a:rPr lang="en-US" dirty="0">
+                  <a:solidFill>
+                    <a:schemeClr val="tx1"/>
+                  </a:solidFill>
+                </a:rPr>
+                <a:t>-id</a:t>
+              </a:r>
+            </a:p>
+            <a:p>
+              <a:r>
+                <a:rPr lang="en-US" dirty="0">
+                  <a:solidFill>
+                    <a:schemeClr val="tx1"/>
+                  </a:solidFill>
+                </a:rPr>
+                <a:t>-title</a:t>
+              </a:r>
+            </a:p>
+            <a:p>
+              <a:r>
+                <a:rPr lang="en-US" dirty="0">
+                  <a:solidFill>
+                    <a:schemeClr val="tx1"/>
+                  </a:solidFill>
+                </a:rPr>
+                <a:t>-genre</a:t>
+              </a:r>
+            </a:p>
+            <a:p>
+              <a:r>
+                <a:rPr lang="en-US" dirty="0">
+                  <a:solidFill>
+                    <a:schemeClr val="tx1"/>
+                  </a:solidFill>
+                </a:rPr>
+                <a:t>-author</a:t>
+              </a:r>
+            </a:p>
+          </p:txBody>
+        </p:sp>
+      </p:grpSp>
+      <p:cxnSp>
+        <p:nvCxnSpPr>
+          <p:cNvPr id="9" name="Straight Arrow Connector 8">
+            <a:extLst>
+              <a:ext uri="{FF2B5EF4-FFF2-40B4-BE49-F238E27FC236}">
+                <a16:creationId xmlns:a16="http://schemas.microsoft.com/office/drawing/2014/main" id="{49B6AB6B-5F35-4EA8-DCB9-940751C9CCA3}"/>
+              </a:ext>
+            </a:extLst>
+          </p:cNvPr>
+          <p:cNvCxnSpPr>
+            <a:cxnSpLocks/>
+            <a:stCxn id="4" idx="3"/>
+            <a:endCxn id="7" idx="1"/>
+          </p:cNvCxnSpPr>
+          <p:nvPr/>
+        </p:nvCxnSpPr>
+        <p:spPr>
+          <a:xfrm>
+            <a:off x="2952750" y="1794187"/>
+            <a:ext cx="1780318" cy="0"/>
+          </a:xfrm>
+          <a:prstGeom prst="straightConnector1">
+            <a:avLst/>
+          </a:prstGeom>
+          <a:ln w="25400">
+            <a:solidFill>
+              <a:schemeClr val="tx1"/>
+            </a:solidFill>
+            <a:tailEnd type="triangle"/>
+          </a:ln>
+        </p:spPr>
+        <p:style>
+          <a:lnRef idx="1">
+            <a:schemeClr val="accent1"/>
+          </a:lnRef>
+          <a:fillRef idx="0">
+            <a:schemeClr val="accent1"/>
+          </a:fillRef>
+          <a:effectRef idx="0">
+            <a:schemeClr val="accent1"/>
+          </a:effectRef>
+          <a:fontRef idx="minor">
+            <a:schemeClr val="tx1"/>
+          </a:fontRef>
+        </p:style>
+      </p:cxnSp>
+      <p:sp>
+        <p:nvSpPr>
+          <p:cNvPr id="11" name="TextBox 10">
+            <a:extLst>
+              <a:ext uri="{FF2B5EF4-FFF2-40B4-BE49-F238E27FC236}">
+                <a16:creationId xmlns:a16="http://schemas.microsoft.com/office/drawing/2014/main" id="{ADF2FE5E-37F9-8D81-F8D7-AD2009D50E0B}"/>
+              </a:ext>
+            </a:extLst>
+          </p:cNvPr>
+          <p:cNvSpPr txBox="1"/>
+          <p:nvPr/>
+        </p:nvSpPr>
+        <p:spPr>
+          <a:xfrm>
+            <a:off x="3040732" y="1276350"/>
+            <a:ext cx="301686" cy="369332"/>
+          </a:xfrm>
+          <a:prstGeom prst="rect">
+            <a:avLst/>
+          </a:prstGeom>
+          <a:noFill/>
+        </p:spPr>
+        <p:txBody>
+          <a:bodyPr wrap="none" rtlCol="0">
+            <a:spAutoFit/>
+          </a:bodyPr>
+          <a:lstStyle/>
+          <a:p>
+            <a:r>
+              <a:rPr lang="en-US" dirty="0"/>
+              <a:t>1</a:t>
+            </a:r>
+          </a:p>
+        </p:txBody>
+      </p:sp>
+      <p:sp>
+        <p:nvSpPr>
+          <p:cNvPr id="12" name="TextBox 11">
+            <a:extLst>
+              <a:ext uri="{FF2B5EF4-FFF2-40B4-BE49-F238E27FC236}">
+                <a16:creationId xmlns:a16="http://schemas.microsoft.com/office/drawing/2014/main" id="{3929E76B-48E8-E3A1-09B6-5ADDB576762B}"/>
+              </a:ext>
+            </a:extLst>
+          </p:cNvPr>
+          <p:cNvSpPr txBox="1"/>
+          <p:nvPr/>
+        </p:nvSpPr>
+        <p:spPr>
+          <a:xfrm>
+            <a:off x="4343400" y="1276350"/>
+            <a:ext cx="333746" cy="369332"/>
+          </a:xfrm>
+          <a:prstGeom prst="rect">
+            <a:avLst/>
+          </a:prstGeom>
+          <a:noFill/>
+        </p:spPr>
+        <p:txBody>
+          <a:bodyPr wrap="none" rtlCol="0">
+            <a:spAutoFit/>
+          </a:bodyPr>
+          <a:lstStyle/>
+          <a:p>
+            <a:r>
+              <a:rPr lang="en-US" dirty="0"/>
+              <a:t>N</a:t>
+            </a:r>
+          </a:p>
+        </p:txBody>
+      </p:sp>
+      <p:grpSp>
+        <p:nvGrpSpPr>
+          <p:cNvPr id="15" name="Group 14">
+            <a:extLst>
+              <a:ext uri="{FF2B5EF4-FFF2-40B4-BE49-F238E27FC236}">
+                <a16:creationId xmlns:a16="http://schemas.microsoft.com/office/drawing/2014/main" id="{15B7E492-3644-5AC9-9B68-4E6EA92DAA5B}"/>
+              </a:ext>
+            </a:extLst>
+          </p:cNvPr>
+          <p:cNvGrpSpPr/>
+          <p:nvPr/>
+        </p:nvGrpSpPr>
+        <p:grpSpPr>
+          <a:xfrm>
+            <a:off x="1332643" y="3209074"/>
+            <a:ext cx="1620107" cy="2038350"/>
+            <a:chOff x="971551" y="923916"/>
+            <a:chExt cx="1428750" cy="942984"/>
+          </a:xfrm>
+        </p:grpSpPr>
+        <p:sp>
+          <p:nvSpPr>
+            <p:cNvPr id="16" name="Rectangle 15">
+              <a:extLst>
+                <a:ext uri="{FF2B5EF4-FFF2-40B4-BE49-F238E27FC236}">
+                  <a16:creationId xmlns:a16="http://schemas.microsoft.com/office/drawing/2014/main" id="{B3504E61-BD9F-1B9F-2F89-35588B710008}"/>
+                </a:ext>
+              </a:extLst>
+            </p:cNvPr>
+            <p:cNvSpPr/>
+            <p:nvPr/>
+          </p:nvSpPr>
+          <p:spPr>
+            <a:xfrm>
+              <a:off x="971551" y="923916"/>
+              <a:ext cx="1428750" cy="171459"/>
+            </a:xfrm>
+            <a:prstGeom prst="rect">
+              <a:avLst/>
+            </a:prstGeom>
+            <a:noFill/>
+            <a:ln w="25400">
+              <a:solidFill>
+                <a:schemeClr val="tx1"/>
+              </a:solidFill>
+            </a:ln>
+          </p:spPr>
+          <p:style>
+            <a:lnRef idx="2">
+              <a:schemeClr val="accent1">
+                <a:shade val="50000"/>
+              </a:schemeClr>
+            </a:lnRef>
+            <a:fillRef idx="1">
+              <a:schemeClr val="accent1"/>
+            </a:fillRef>
+            <a:effectRef idx="0">
+              <a:schemeClr val="accent1"/>
+            </a:effectRef>
+            <a:fontRef idx="minor">
+              <a:schemeClr val="lt1"/>
+            </a:fontRef>
+          </p:style>
+          <p:txBody>
+            <a:bodyPr rtlCol="0" anchor="ctr"/>
+            <a:lstStyle/>
+            <a:p>
+              <a:pPr algn="ctr"/>
+              <a:r>
+                <a:rPr lang="en-US" dirty="0">
+                  <a:solidFill>
+                    <a:schemeClr val="tx1"/>
+                  </a:solidFill>
+                </a:rPr>
+                <a:t>Customer</a:t>
+              </a:r>
+            </a:p>
+          </p:txBody>
+        </p:sp>
+        <p:sp>
+          <p:nvSpPr>
+            <p:cNvPr id="17" name="Rectangle 16">
+              <a:extLst>
+                <a:ext uri="{FF2B5EF4-FFF2-40B4-BE49-F238E27FC236}">
+                  <a16:creationId xmlns:a16="http://schemas.microsoft.com/office/drawing/2014/main" id="{38429475-F8ED-5D17-DADE-8557F1050107}"/>
+                </a:ext>
+              </a:extLst>
+            </p:cNvPr>
+            <p:cNvSpPr/>
+            <p:nvPr/>
+          </p:nvSpPr>
+          <p:spPr>
+            <a:xfrm>
+              <a:off x="971551" y="1095375"/>
+              <a:ext cx="1428750" cy="771525"/>
+            </a:xfrm>
+            <a:prstGeom prst="rect">
+              <a:avLst/>
+            </a:prstGeom>
+            <a:noFill/>
+            <a:ln w="25400">
+              <a:solidFill>
+                <a:schemeClr val="tx1"/>
+              </a:solidFill>
+            </a:ln>
+          </p:spPr>
+          <p:style>
+            <a:lnRef idx="2">
+              <a:schemeClr val="accent1">
+                <a:shade val="50000"/>
+              </a:schemeClr>
+            </a:lnRef>
+            <a:fillRef idx="1">
+              <a:schemeClr val="accent1"/>
+            </a:fillRef>
+            <a:effectRef idx="0">
+              <a:schemeClr val="accent1"/>
+            </a:effectRef>
+            <a:fontRef idx="minor">
+              <a:schemeClr val="lt1"/>
+            </a:fontRef>
+          </p:style>
+          <p:txBody>
+            <a:bodyPr rtlCol="0" anchor="ctr"/>
+            <a:lstStyle/>
+            <a:p>
+              <a:r>
+                <a:rPr lang="en-US" dirty="0">
+                  <a:solidFill>
+                    <a:schemeClr val="tx1"/>
+                  </a:solidFill>
+                </a:rPr>
+                <a:t>-</a:t>
+              </a:r>
+              <a:r>
+                <a:rPr lang="en-US" dirty="0" err="1">
+                  <a:solidFill>
+                    <a:schemeClr val="tx1"/>
+                  </a:solidFill>
+                </a:rPr>
+                <a:t>customerID</a:t>
+              </a:r>
+              <a:endParaRPr lang="en-US" dirty="0">
+                <a:solidFill>
+                  <a:schemeClr val="tx1"/>
+                </a:solidFill>
+              </a:endParaRPr>
+            </a:p>
+            <a:p>
+              <a:r>
+                <a:rPr lang="en-US" dirty="0">
+                  <a:solidFill>
+                    <a:schemeClr val="tx1"/>
+                  </a:solidFill>
+                </a:rPr>
+                <a:t>-</a:t>
+              </a:r>
+              <a:r>
+                <a:rPr lang="en-US" dirty="0" err="1">
+                  <a:solidFill>
+                    <a:schemeClr val="tx1"/>
+                  </a:solidFill>
+                </a:rPr>
+                <a:t>firstName</a:t>
+              </a:r>
+              <a:endParaRPr lang="en-US" dirty="0">
+                <a:solidFill>
+                  <a:schemeClr val="tx1"/>
+                </a:solidFill>
+              </a:endParaRPr>
+            </a:p>
+            <a:p>
+              <a:r>
+                <a:rPr lang="en-US" dirty="0">
+                  <a:solidFill>
+                    <a:schemeClr val="tx1"/>
+                  </a:solidFill>
+                </a:rPr>
+                <a:t>-</a:t>
+              </a:r>
+              <a:r>
+                <a:rPr lang="en-US" dirty="0" err="1">
+                  <a:solidFill>
+                    <a:schemeClr val="tx1"/>
+                  </a:solidFill>
+                </a:rPr>
+                <a:t>lastName</a:t>
+              </a:r>
+              <a:endParaRPr lang="en-US" dirty="0">
+                <a:solidFill>
+                  <a:schemeClr val="tx1"/>
+                </a:solidFill>
+              </a:endParaRPr>
+            </a:p>
+          </p:txBody>
+        </p:sp>
+      </p:grpSp>
+      <p:cxnSp>
+        <p:nvCxnSpPr>
+          <p:cNvPr id="21" name="Straight Arrow Connector 20">
+            <a:extLst>
+              <a:ext uri="{FF2B5EF4-FFF2-40B4-BE49-F238E27FC236}">
+                <a16:creationId xmlns:a16="http://schemas.microsoft.com/office/drawing/2014/main" id="{E85C8ECB-F935-D0A5-BABB-945CBCD51B09}"/>
+              </a:ext>
+            </a:extLst>
+          </p:cNvPr>
+          <p:cNvCxnSpPr>
+            <a:cxnSpLocks/>
+            <a:stCxn id="17" idx="3"/>
+          </p:cNvCxnSpPr>
+          <p:nvPr/>
+        </p:nvCxnSpPr>
+        <p:spPr>
+          <a:xfrm>
+            <a:off x="2952750" y="4413562"/>
+            <a:ext cx="1780318" cy="0"/>
+          </a:xfrm>
+          <a:prstGeom prst="straightConnector1">
+            <a:avLst/>
+          </a:prstGeom>
+          <a:ln w="25400">
+            <a:solidFill>
+              <a:schemeClr val="tx1"/>
+            </a:solidFill>
+            <a:tailEnd type="triangle"/>
+          </a:ln>
+        </p:spPr>
+        <p:style>
+          <a:lnRef idx="1">
+            <a:schemeClr val="accent1"/>
+          </a:lnRef>
+          <a:fillRef idx="0">
+            <a:schemeClr val="accent1"/>
+          </a:fillRef>
+          <a:effectRef idx="0">
+            <a:schemeClr val="accent1"/>
+          </a:effectRef>
+          <a:fontRef idx="minor">
+            <a:schemeClr val="tx1"/>
+          </a:fontRef>
+        </p:style>
+      </p:cxnSp>
+      <p:sp>
+        <p:nvSpPr>
+          <p:cNvPr id="22" name="TextBox 21">
+            <a:extLst>
+              <a:ext uri="{FF2B5EF4-FFF2-40B4-BE49-F238E27FC236}">
+                <a16:creationId xmlns:a16="http://schemas.microsoft.com/office/drawing/2014/main" id="{89DBEF7A-9352-D838-DADF-C7594DC3AAB8}"/>
+              </a:ext>
+            </a:extLst>
+          </p:cNvPr>
+          <p:cNvSpPr txBox="1"/>
+          <p:nvPr/>
+        </p:nvSpPr>
+        <p:spPr>
+          <a:xfrm>
+            <a:off x="3040732" y="3895725"/>
+            <a:ext cx="301686" cy="369332"/>
+          </a:xfrm>
+          <a:prstGeom prst="rect">
+            <a:avLst/>
+          </a:prstGeom>
+          <a:noFill/>
+        </p:spPr>
+        <p:txBody>
+          <a:bodyPr wrap="none" rtlCol="0">
+            <a:spAutoFit/>
+          </a:bodyPr>
+          <a:lstStyle/>
+          <a:p>
+            <a:r>
+              <a:rPr lang="en-US" dirty="0"/>
+              <a:t>1</a:t>
+            </a:r>
+          </a:p>
+        </p:txBody>
+      </p:sp>
+      <p:sp>
+        <p:nvSpPr>
+          <p:cNvPr id="23" name="TextBox 22">
+            <a:extLst>
+              <a:ext uri="{FF2B5EF4-FFF2-40B4-BE49-F238E27FC236}">
+                <a16:creationId xmlns:a16="http://schemas.microsoft.com/office/drawing/2014/main" id="{AFC4ECF2-4980-FF29-12B7-1EC0ED7FD7AF}"/>
+              </a:ext>
+            </a:extLst>
+          </p:cNvPr>
+          <p:cNvSpPr txBox="1"/>
+          <p:nvPr/>
+        </p:nvSpPr>
+        <p:spPr>
+          <a:xfrm>
+            <a:off x="4343400" y="3895725"/>
+            <a:ext cx="333746" cy="369332"/>
+          </a:xfrm>
+          <a:prstGeom prst="rect">
+            <a:avLst/>
+          </a:prstGeom>
+          <a:noFill/>
+        </p:spPr>
+        <p:txBody>
+          <a:bodyPr wrap="none" rtlCol="0">
+            <a:spAutoFit/>
+          </a:bodyPr>
+          <a:lstStyle/>
+          <a:p>
+            <a:r>
+              <a:rPr lang="en-US" dirty="0"/>
+              <a:t>N</a:t>
+            </a:r>
+          </a:p>
+        </p:txBody>
+      </p:sp>
+      <p:grpSp>
+        <p:nvGrpSpPr>
+          <p:cNvPr id="24" name="Group 23">
+            <a:extLst>
+              <a:ext uri="{FF2B5EF4-FFF2-40B4-BE49-F238E27FC236}">
+                <a16:creationId xmlns:a16="http://schemas.microsoft.com/office/drawing/2014/main" id="{80081198-A91E-4AE0-496F-5FFB052B32C6}"/>
+              </a:ext>
+            </a:extLst>
+          </p:cNvPr>
+          <p:cNvGrpSpPr/>
+          <p:nvPr/>
+        </p:nvGrpSpPr>
+        <p:grpSpPr>
+          <a:xfrm>
+            <a:off x="4733068" y="3210777"/>
+            <a:ext cx="1620107" cy="2038350"/>
+            <a:chOff x="971551" y="923916"/>
+            <a:chExt cx="1428750" cy="942984"/>
+          </a:xfrm>
+        </p:grpSpPr>
+        <p:sp>
+          <p:nvSpPr>
+            <p:cNvPr id="25" name="Rectangle 24">
+              <a:extLst>
+                <a:ext uri="{FF2B5EF4-FFF2-40B4-BE49-F238E27FC236}">
+                  <a16:creationId xmlns:a16="http://schemas.microsoft.com/office/drawing/2014/main" id="{A1C173AA-737C-CC66-5472-1AE910070C06}"/>
+                </a:ext>
+              </a:extLst>
+            </p:cNvPr>
+            <p:cNvSpPr/>
+            <p:nvPr/>
+          </p:nvSpPr>
+          <p:spPr>
+            <a:xfrm>
+              <a:off x="971551" y="923916"/>
+              <a:ext cx="1428750" cy="171459"/>
+            </a:xfrm>
+            <a:prstGeom prst="rect">
+              <a:avLst/>
+            </a:prstGeom>
+            <a:noFill/>
+            <a:ln w="25400">
+              <a:solidFill>
+                <a:schemeClr val="tx1"/>
+              </a:solidFill>
+            </a:ln>
+          </p:spPr>
+          <p:style>
+            <a:lnRef idx="2">
+              <a:schemeClr val="accent1">
+                <a:shade val="50000"/>
+              </a:schemeClr>
+            </a:lnRef>
+            <a:fillRef idx="1">
+              <a:schemeClr val="accent1"/>
+            </a:fillRef>
+            <a:effectRef idx="0">
+              <a:schemeClr val="accent1"/>
+            </a:effectRef>
+            <a:fontRef idx="minor">
+              <a:schemeClr val="lt1"/>
+            </a:fontRef>
+          </p:style>
+          <p:txBody>
+            <a:bodyPr rtlCol="0" anchor="ctr"/>
+            <a:lstStyle/>
+            <a:p>
+              <a:pPr algn="ctr"/>
+              <a:r>
+                <a:rPr lang="en-US" dirty="0">
+                  <a:solidFill>
+                    <a:schemeClr val="tx1"/>
+                  </a:solidFill>
+                </a:rPr>
+                <a:t>Wish list</a:t>
+              </a:r>
+            </a:p>
+          </p:txBody>
+        </p:sp>
+        <p:sp>
+          <p:nvSpPr>
+            <p:cNvPr id="26" name="Rectangle 25">
+              <a:extLst>
+                <a:ext uri="{FF2B5EF4-FFF2-40B4-BE49-F238E27FC236}">
+                  <a16:creationId xmlns:a16="http://schemas.microsoft.com/office/drawing/2014/main" id="{CF01A514-D83B-F09F-C876-188D88DD403B}"/>
+                </a:ext>
+              </a:extLst>
+            </p:cNvPr>
+            <p:cNvSpPr/>
+            <p:nvPr/>
+          </p:nvSpPr>
+          <p:spPr>
+            <a:xfrm>
+              <a:off x="971551" y="1095375"/>
+              <a:ext cx="1428750" cy="771525"/>
+            </a:xfrm>
+            <a:prstGeom prst="rect">
+              <a:avLst/>
+            </a:prstGeom>
+            <a:noFill/>
+            <a:ln w="25400">
+              <a:solidFill>
+                <a:schemeClr val="tx1"/>
+              </a:solidFill>
+            </a:ln>
+          </p:spPr>
+          <p:style>
+            <a:lnRef idx="2">
+              <a:schemeClr val="accent1">
+                <a:shade val="50000"/>
+              </a:schemeClr>
+            </a:lnRef>
+            <a:fillRef idx="1">
+              <a:schemeClr val="accent1"/>
+            </a:fillRef>
+            <a:effectRef idx="0">
+              <a:schemeClr val="accent1"/>
+            </a:effectRef>
+            <a:fontRef idx="minor">
+              <a:schemeClr val="lt1"/>
+            </a:fontRef>
+          </p:style>
+          <p:txBody>
+            <a:bodyPr rtlCol="0" anchor="ctr"/>
+            <a:lstStyle/>
+            <a:p>
+              <a:r>
+                <a:rPr lang="en-US" dirty="0">
+                  <a:solidFill>
+                    <a:schemeClr val="tx1"/>
+                  </a:solidFill>
+                </a:rPr>
+                <a:t>-</a:t>
+              </a:r>
+              <a:r>
+                <a:rPr lang="en-US" dirty="0" err="1">
+                  <a:solidFill>
+                    <a:schemeClr val="tx1"/>
+                  </a:solidFill>
+                </a:rPr>
+                <a:t>bookID</a:t>
+              </a:r>
+              <a:endParaRPr lang="en-US" dirty="0">
+                <a:solidFill>
+                  <a:schemeClr val="tx1"/>
+                </a:solidFill>
+              </a:endParaRPr>
+            </a:p>
+            <a:p>
+              <a:r>
+                <a:rPr lang="en-US" dirty="0">
+                  <a:solidFill>
+                    <a:schemeClr val="tx1"/>
+                  </a:solidFill>
+                </a:rPr>
+                <a:t>-title</a:t>
+              </a:r>
+            </a:p>
+          </p:txBody>
+        </p:sp>
+      </p:grpSp>
+    </p:spTree>
+    <p:extLst>
+      <p:ext uri="{BB962C8B-B14F-4D97-AF65-F5344CB8AC3E}">
+        <p14:creationId xmlns:p14="http://schemas.microsoft.com/office/powerpoint/2010/main" val="3136559072"/>
+      </p:ext>
+    </p:extLst>
+  </p:cSld>
+  <p:clrMapOvr>
+    <a:masterClrMapping/>
+  </p:clrMapOvr>
+</p:sld>
+</file>
+
+<file path=ppt/slides/slide5.xml><?xml version="1.0" encoding="utf-8"?>
+<p:sld xmlns:a="http://schemas.openxmlformats.org/drawingml/2006/main" xmlns:r="http://schemas.openxmlformats.org/officeDocument/2006/relationships" xmlns:p="http://schemas.openxmlformats.org/presentationml/2006/main">
+  <p:cSld>
+    <p:spTree>
+      <p:nvGrpSpPr>
+        <p:cNvPr id="1" name=""/>
+        <p:cNvGrpSpPr/>
+        <p:nvPr/>
+      </p:nvGrpSpPr>
+      <p:grpSpPr>
+        <a:xfrm>
+          <a:off x="0" y="0"/>
+          <a:ext cx="0" cy="0"/>
+          <a:chOff x="0" y="0"/>
+          <a:chExt cx="0" cy="0"/>
+        </a:xfrm>
+      </p:grpSpPr>
+      <p:grpSp>
+        <p:nvGrpSpPr>
+          <p:cNvPr id="2" name="Group 1">
+            <a:extLst>
+              <a:ext uri="{FF2B5EF4-FFF2-40B4-BE49-F238E27FC236}">
+                <a16:creationId xmlns:a16="http://schemas.microsoft.com/office/drawing/2014/main" id="{66EC6593-6EBB-AD91-F3DD-4868CA19B4C7}"/>
+              </a:ext>
+            </a:extLst>
+          </p:cNvPr>
+          <p:cNvGrpSpPr/>
+          <p:nvPr/>
+        </p:nvGrpSpPr>
+        <p:grpSpPr>
+          <a:xfrm>
+            <a:off x="1332643" y="589699"/>
+            <a:ext cx="1620107" cy="2038350"/>
+            <a:chOff x="971551" y="923916"/>
+            <a:chExt cx="1428750" cy="942984"/>
+          </a:xfrm>
+        </p:grpSpPr>
+        <p:sp>
+          <p:nvSpPr>
+            <p:cNvPr id="3" name="Rectangle 2">
+              <a:extLst>
+                <a:ext uri="{FF2B5EF4-FFF2-40B4-BE49-F238E27FC236}">
+                  <a16:creationId xmlns:a16="http://schemas.microsoft.com/office/drawing/2014/main" id="{A9E6EF2F-40D0-3106-3EE0-011A6302301B}"/>
+                </a:ext>
+              </a:extLst>
+            </p:cNvPr>
+            <p:cNvSpPr/>
+            <p:nvPr/>
+          </p:nvSpPr>
+          <p:spPr>
+            <a:xfrm>
+              <a:off x="971551" y="923916"/>
+              <a:ext cx="1428750" cy="171459"/>
+            </a:xfrm>
+            <a:prstGeom prst="rect">
+              <a:avLst/>
+            </a:prstGeom>
+            <a:noFill/>
+            <a:ln w="25400">
+              <a:solidFill>
+                <a:schemeClr val="tx1"/>
+              </a:solidFill>
+            </a:ln>
+          </p:spPr>
+          <p:style>
+            <a:lnRef idx="2">
+              <a:schemeClr val="accent1">
+                <a:shade val="50000"/>
+              </a:schemeClr>
+            </a:lnRef>
+            <a:fillRef idx="1">
+              <a:schemeClr val="accent1"/>
+            </a:fillRef>
+            <a:effectRef idx="0">
+              <a:schemeClr val="accent1"/>
+            </a:effectRef>
+            <a:fontRef idx="minor">
+              <a:schemeClr val="lt1"/>
+            </a:fontRef>
+          </p:style>
+          <p:txBody>
+            <a:bodyPr rtlCol="0" anchor="ctr"/>
+            <a:lstStyle/>
+            <a:p>
+              <a:pPr algn="ctr"/>
+              <a:r>
+                <a:rPr lang="en-US" dirty="0" err="1">
+                  <a:solidFill>
+                    <a:schemeClr val="tx1"/>
+                  </a:solidFill>
+                </a:rPr>
+                <a:t>Whatabook</a:t>
+              </a:r>
+              <a:endParaRPr lang="en-US" dirty="0">
+                <a:solidFill>
+                  <a:schemeClr val="tx1"/>
+                </a:solidFill>
+              </a:endParaRPr>
+            </a:p>
+          </p:txBody>
+        </p:sp>
+        <p:sp>
+          <p:nvSpPr>
+            <p:cNvPr id="4" name="Rectangle 3">
+              <a:extLst>
+                <a:ext uri="{FF2B5EF4-FFF2-40B4-BE49-F238E27FC236}">
+                  <a16:creationId xmlns:a16="http://schemas.microsoft.com/office/drawing/2014/main" id="{24F34E7D-CCD2-CA6A-0AE3-BBAE9701E59D}"/>
+                </a:ext>
+              </a:extLst>
+            </p:cNvPr>
+            <p:cNvSpPr/>
+            <p:nvPr/>
+          </p:nvSpPr>
+          <p:spPr>
+            <a:xfrm>
+              <a:off x="971551" y="1095375"/>
+              <a:ext cx="1428750" cy="771525"/>
+            </a:xfrm>
+            <a:prstGeom prst="rect">
+              <a:avLst/>
+            </a:prstGeom>
+            <a:noFill/>
+            <a:ln w="25400">
+              <a:solidFill>
+                <a:schemeClr val="tx1"/>
+              </a:solidFill>
+            </a:ln>
+          </p:spPr>
+          <p:style>
+            <a:lnRef idx="2">
+              <a:schemeClr val="accent1">
+                <a:shade val="50000"/>
+              </a:schemeClr>
+            </a:lnRef>
+            <a:fillRef idx="1">
+              <a:schemeClr val="accent1"/>
+            </a:fillRef>
+            <a:effectRef idx="0">
+              <a:schemeClr val="accent1"/>
+            </a:effectRef>
+            <a:fontRef idx="minor">
+              <a:schemeClr val="lt1"/>
+            </a:fontRef>
+          </p:style>
+          <p:txBody>
+            <a:bodyPr rtlCol="0" anchor="ctr"/>
+            <a:lstStyle/>
+            <a:p>
+              <a:endParaRPr lang="en-US" dirty="0">
+                <a:solidFill>
+                  <a:schemeClr val="tx1"/>
+                </a:solidFill>
+              </a:endParaRPr>
+            </a:p>
+          </p:txBody>
+        </p:sp>
+      </p:grpSp>
+      <p:grpSp>
+        <p:nvGrpSpPr>
+          <p:cNvPr id="5" name="Group 4">
+            <a:extLst>
+              <a:ext uri="{FF2B5EF4-FFF2-40B4-BE49-F238E27FC236}">
+                <a16:creationId xmlns:a16="http://schemas.microsoft.com/office/drawing/2014/main" id="{56F647FB-C126-AD83-B9B5-5F25008D7603}"/>
+              </a:ext>
+            </a:extLst>
+          </p:cNvPr>
+          <p:cNvGrpSpPr/>
+          <p:nvPr/>
+        </p:nvGrpSpPr>
+        <p:grpSpPr>
+          <a:xfrm>
+            <a:off x="4733068" y="589699"/>
+            <a:ext cx="1620107" cy="2038350"/>
+            <a:chOff x="971551" y="923916"/>
+            <a:chExt cx="1428750" cy="942984"/>
+          </a:xfrm>
+        </p:grpSpPr>
+        <p:sp>
+          <p:nvSpPr>
+            <p:cNvPr id="6" name="Rectangle 5">
+              <a:extLst>
+                <a:ext uri="{FF2B5EF4-FFF2-40B4-BE49-F238E27FC236}">
+                  <a16:creationId xmlns:a16="http://schemas.microsoft.com/office/drawing/2014/main" id="{39DB9C11-08F9-A500-489E-136FC7E5E43D}"/>
+                </a:ext>
+              </a:extLst>
+            </p:cNvPr>
+            <p:cNvSpPr/>
+            <p:nvPr/>
+          </p:nvSpPr>
+          <p:spPr>
+            <a:xfrm>
+              <a:off x="971551" y="923916"/>
+              <a:ext cx="1428750" cy="171459"/>
+            </a:xfrm>
+            <a:prstGeom prst="rect">
+              <a:avLst/>
+            </a:prstGeom>
+            <a:noFill/>
+            <a:ln w="25400">
+              <a:solidFill>
+                <a:schemeClr val="tx1"/>
+              </a:solidFill>
+            </a:ln>
+          </p:spPr>
+          <p:style>
+            <a:lnRef idx="2">
+              <a:schemeClr val="accent1">
+                <a:shade val="50000"/>
+              </a:schemeClr>
+            </a:lnRef>
+            <a:fillRef idx="1">
+              <a:schemeClr val="accent1"/>
+            </a:fillRef>
+            <a:effectRef idx="0">
+              <a:schemeClr val="accent1"/>
+            </a:effectRef>
+            <a:fontRef idx="minor">
+              <a:schemeClr val="lt1"/>
+            </a:fontRef>
+          </p:style>
+          <p:txBody>
+            <a:bodyPr rtlCol="0" anchor="ctr"/>
+            <a:lstStyle/>
+            <a:p>
+              <a:pPr algn="ctr"/>
+              <a:r>
+                <a:rPr lang="en-US" dirty="0">
+                  <a:solidFill>
+                    <a:schemeClr val="tx1"/>
+                  </a:solidFill>
+                </a:rPr>
+                <a:t>Books</a:t>
+              </a:r>
+            </a:p>
+          </p:txBody>
+        </p:sp>
+        <p:sp>
+          <p:nvSpPr>
+            <p:cNvPr id="7" name="Rectangle 6">
+              <a:extLst>
+                <a:ext uri="{FF2B5EF4-FFF2-40B4-BE49-F238E27FC236}">
+                  <a16:creationId xmlns:a16="http://schemas.microsoft.com/office/drawing/2014/main" id="{10894642-977F-C343-AE29-F6EA9C14CA89}"/>
+                </a:ext>
+              </a:extLst>
+            </p:cNvPr>
+            <p:cNvSpPr/>
+            <p:nvPr/>
+          </p:nvSpPr>
+          <p:spPr>
+            <a:xfrm>
+              <a:off x="971551" y="1095375"/>
+              <a:ext cx="1428750" cy="771525"/>
+            </a:xfrm>
+            <a:prstGeom prst="rect">
+              <a:avLst/>
+            </a:prstGeom>
+            <a:noFill/>
+            <a:ln w="25400">
+              <a:solidFill>
+                <a:schemeClr val="tx1"/>
+              </a:solidFill>
+            </a:ln>
+          </p:spPr>
+          <p:style>
+            <a:lnRef idx="2">
+              <a:schemeClr val="accent1">
+                <a:shade val="50000"/>
+              </a:schemeClr>
+            </a:lnRef>
+            <a:fillRef idx="1">
+              <a:schemeClr val="accent1"/>
+            </a:fillRef>
+            <a:effectRef idx="0">
+              <a:schemeClr val="accent1"/>
+            </a:effectRef>
+            <a:fontRef idx="minor">
+              <a:schemeClr val="lt1"/>
+            </a:fontRef>
+          </p:style>
+          <p:txBody>
+            <a:bodyPr rtlCol="0" anchor="ctr"/>
+            <a:lstStyle/>
+            <a:p>
+              <a:r>
+                <a:rPr lang="en-US" dirty="0">
+                  <a:solidFill>
+                    <a:schemeClr val="tx1"/>
+                  </a:solidFill>
+                </a:rPr>
+                <a:t>-id</a:t>
+              </a:r>
+            </a:p>
+            <a:p>
+              <a:r>
+                <a:rPr lang="en-US" dirty="0">
+                  <a:solidFill>
+                    <a:schemeClr val="tx1"/>
+                  </a:solidFill>
+                </a:rPr>
+                <a:t>-title</a:t>
+              </a:r>
+            </a:p>
+            <a:p>
+              <a:r>
+                <a:rPr lang="en-US" dirty="0">
+                  <a:solidFill>
+                    <a:schemeClr val="tx1"/>
+                  </a:solidFill>
+                </a:rPr>
+                <a:t>-genre</a:t>
+              </a:r>
+            </a:p>
+            <a:p>
+              <a:r>
+                <a:rPr lang="en-US" dirty="0">
+                  <a:solidFill>
+                    <a:schemeClr val="tx1"/>
+                  </a:solidFill>
+                </a:rPr>
+                <a:t>-author</a:t>
+              </a:r>
+            </a:p>
+          </p:txBody>
+        </p:sp>
+      </p:grpSp>
+      <p:cxnSp>
+        <p:nvCxnSpPr>
+          <p:cNvPr id="8" name="Straight Arrow Connector 7">
+            <a:extLst>
+              <a:ext uri="{FF2B5EF4-FFF2-40B4-BE49-F238E27FC236}">
+                <a16:creationId xmlns:a16="http://schemas.microsoft.com/office/drawing/2014/main" id="{6C7BD143-9DE8-4BE4-F42E-16AD6652F0B4}"/>
+              </a:ext>
+            </a:extLst>
+          </p:cNvPr>
+          <p:cNvCxnSpPr>
+            <a:cxnSpLocks/>
+            <a:stCxn id="4" idx="3"/>
+            <a:endCxn id="7" idx="1"/>
+          </p:cNvCxnSpPr>
+          <p:nvPr/>
+        </p:nvCxnSpPr>
+        <p:spPr>
+          <a:xfrm>
+            <a:off x="2952750" y="1794187"/>
+            <a:ext cx="1780318" cy="0"/>
+          </a:xfrm>
+          <a:prstGeom prst="straightConnector1">
+            <a:avLst/>
+          </a:prstGeom>
+          <a:ln w="25400">
+            <a:solidFill>
+              <a:schemeClr val="tx1"/>
+            </a:solidFill>
+            <a:tailEnd type="triangle"/>
+          </a:ln>
+        </p:spPr>
+        <p:style>
+          <a:lnRef idx="1">
+            <a:schemeClr val="accent1"/>
+          </a:lnRef>
+          <a:fillRef idx="0">
+            <a:schemeClr val="accent1"/>
+          </a:fillRef>
+          <a:effectRef idx="0">
+            <a:schemeClr val="accent1"/>
+          </a:effectRef>
+          <a:fontRef idx="minor">
+            <a:schemeClr val="tx1"/>
+          </a:fontRef>
+        </p:style>
+      </p:cxnSp>
+      <p:sp>
+        <p:nvSpPr>
+          <p:cNvPr id="9" name="TextBox 8">
+            <a:extLst>
+              <a:ext uri="{FF2B5EF4-FFF2-40B4-BE49-F238E27FC236}">
+                <a16:creationId xmlns:a16="http://schemas.microsoft.com/office/drawing/2014/main" id="{C11F4390-9ED2-B305-AEC5-379768251EB9}"/>
+              </a:ext>
+            </a:extLst>
+          </p:cNvPr>
+          <p:cNvSpPr txBox="1"/>
+          <p:nvPr/>
+        </p:nvSpPr>
+        <p:spPr>
+          <a:xfrm>
+            <a:off x="3040732" y="1276350"/>
+            <a:ext cx="301686" cy="369332"/>
+          </a:xfrm>
+          <a:prstGeom prst="rect">
+            <a:avLst/>
+          </a:prstGeom>
+          <a:noFill/>
+        </p:spPr>
+        <p:txBody>
+          <a:bodyPr wrap="none" rtlCol="0">
+            <a:spAutoFit/>
+          </a:bodyPr>
+          <a:lstStyle/>
+          <a:p>
+            <a:r>
+              <a:rPr lang="en-US" dirty="0"/>
+              <a:t>1</a:t>
+            </a:r>
+          </a:p>
+        </p:txBody>
+      </p:sp>
+      <p:sp>
+        <p:nvSpPr>
+          <p:cNvPr id="10" name="TextBox 9">
+            <a:extLst>
+              <a:ext uri="{FF2B5EF4-FFF2-40B4-BE49-F238E27FC236}">
+                <a16:creationId xmlns:a16="http://schemas.microsoft.com/office/drawing/2014/main" id="{2AF88531-621F-1508-06DC-555E31C22932}"/>
+              </a:ext>
+            </a:extLst>
+          </p:cNvPr>
+          <p:cNvSpPr txBox="1"/>
+          <p:nvPr/>
+        </p:nvSpPr>
+        <p:spPr>
+          <a:xfrm>
+            <a:off x="4343400" y="1276350"/>
+            <a:ext cx="333746" cy="369332"/>
+          </a:xfrm>
+          <a:prstGeom prst="rect">
+            <a:avLst/>
+          </a:prstGeom>
+          <a:noFill/>
+        </p:spPr>
+        <p:txBody>
+          <a:bodyPr wrap="none" rtlCol="0">
+            <a:spAutoFit/>
+          </a:bodyPr>
+          <a:lstStyle/>
+          <a:p>
+            <a:r>
+              <a:rPr lang="en-US" dirty="0"/>
+              <a:t>N</a:t>
+            </a:r>
+          </a:p>
+        </p:txBody>
+      </p:sp>
+    </p:spTree>
+    <p:extLst>
+      <p:ext uri="{BB962C8B-B14F-4D97-AF65-F5344CB8AC3E}">
+        <p14:creationId xmlns:p14="http://schemas.microsoft.com/office/powerpoint/2010/main" val="1752498552"/>
+      </p:ext>
+    </p:extLst>
+  </p:cSld>
+  <p:clrMapOvr>
+    <a:masterClrMapping/>
+  </p:clrMapOvr>
+</p:sld>
+</file>
+
 <file path=ppt/theme/theme1.xml><?xml version="1.0" encoding="utf-8"?>
 <a:theme xmlns:a="http://schemas.openxmlformats.org/drawingml/2006/main" name="Office Theme">
   <a:themeElements>

</xml_diff>